<commit_message>
Cambios a 15 de Febrero...
Me quedaría editar sólo la literatura de los productos... quizás poner nuevos, quitar, ... ni puta idea...
Esta vez hago commit y push... YO SOLITO como buen putazo que soy
</commit_message>
<xml_diff>
--- a/img/img_editadas_web.pptx
+++ b/img/img_editadas_web.pptx
@@ -6,14 +6,15 @@
   </p:sldMasterIdLst>
   <p:sldIdLst>
     <p:sldId id="256" r:id="rId2"/>
-    <p:sldId id="257" r:id="rId3"/>
-    <p:sldId id="258" r:id="rId4"/>
-    <p:sldId id="259" r:id="rId5"/>
-    <p:sldId id="260" r:id="rId6"/>
-    <p:sldId id="261" r:id="rId7"/>
-    <p:sldId id="262" r:id="rId8"/>
-    <p:sldId id="263" r:id="rId9"/>
-    <p:sldId id="264" r:id="rId10"/>
+    <p:sldId id="265" r:id="rId3"/>
+    <p:sldId id="257" r:id="rId4"/>
+    <p:sldId id="258" r:id="rId5"/>
+    <p:sldId id="259" r:id="rId6"/>
+    <p:sldId id="260" r:id="rId7"/>
+    <p:sldId id="261" r:id="rId8"/>
+    <p:sldId id="262" r:id="rId9"/>
+    <p:sldId id="263" r:id="rId10"/>
+    <p:sldId id="264" r:id="rId11"/>
   </p:sldIdLst>
   <p:sldSz cx="12192000" cy="6858000"/>
   <p:notesSz cx="6858000" cy="9144000"/>
@@ -280,7 +281,7 @@
           <a:p>
             <a:fld id="{769B505E-3E4C-4259-8B34-E5FA827A4AB9}" type="datetimeFigureOut">
               <a:rPr lang="es-ES" smtClean="0"/>
-              <a:t>16/01/2019</a:t>
+              <a:t>29/01/2019</a:t>
             </a:fld>
             <a:endParaRPr lang="es-ES"/>
           </a:p>
@@ -480,7 +481,7 @@
           <a:p>
             <a:fld id="{769B505E-3E4C-4259-8B34-E5FA827A4AB9}" type="datetimeFigureOut">
               <a:rPr lang="es-ES" smtClean="0"/>
-              <a:t>16/01/2019</a:t>
+              <a:t>29/01/2019</a:t>
             </a:fld>
             <a:endParaRPr lang="es-ES"/>
           </a:p>
@@ -690,7 +691,7 @@
           <a:p>
             <a:fld id="{769B505E-3E4C-4259-8B34-E5FA827A4AB9}" type="datetimeFigureOut">
               <a:rPr lang="es-ES" smtClean="0"/>
-              <a:t>16/01/2019</a:t>
+              <a:t>29/01/2019</a:t>
             </a:fld>
             <a:endParaRPr lang="es-ES"/>
           </a:p>
@@ -890,7 +891,7 @@
           <a:p>
             <a:fld id="{769B505E-3E4C-4259-8B34-E5FA827A4AB9}" type="datetimeFigureOut">
               <a:rPr lang="es-ES" smtClean="0"/>
-              <a:t>16/01/2019</a:t>
+              <a:t>29/01/2019</a:t>
             </a:fld>
             <a:endParaRPr lang="es-ES"/>
           </a:p>
@@ -1166,7 +1167,7 @@
           <a:p>
             <a:fld id="{769B505E-3E4C-4259-8B34-E5FA827A4AB9}" type="datetimeFigureOut">
               <a:rPr lang="es-ES" smtClean="0"/>
-              <a:t>16/01/2019</a:t>
+              <a:t>29/01/2019</a:t>
             </a:fld>
             <a:endParaRPr lang="es-ES"/>
           </a:p>
@@ -1434,7 +1435,7 @@
           <a:p>
             <a:fld id="{769B505E-3E4C-4259-8B34-E5FA827A4AB9}" type="datetimeFigureOut">
               <a:rPr lang="es-ES" smtClean="0"/>
-              <a:t>16/01/2019</a:t>
+              <a:t>29/01/2019</a:t>
             </a:fld>
             <a:endParaRPr lang="es-ES"/>
           </a:p>
@@ -1849,7 +1850,7 @@
           <a:p>
             <a:fld id="{769B505E-3E4C-4259-8B34-E5FA827A4AB9}" type="datetimeFigureOut">
               <a:rPr lang="es-ES" smtClean="0"/>
-              <a:t>16/01/2019</a:t>
+              <a:t>29/01/2019</a:t>
             </a:fld>
             <a:endParaRPr lang="es-ES"/>
           </a:p>
@@ -1991,7 +1992,7 @@
           <a:p>
             <a:fld id="{769B505E-3E4C-4259-8B34-E5FA827A4AB9}" type="datetimeFigureOut">
               <a:rPr lang="es-ES" smtClean="0"/>
-              <a:t>16/01/2019</a:t>
+              <a:t>29/01/2019</a:t>
             </a:fld>
             <a:endParaRPr lang="es-ES"/>
           </a:p>
@@ -2104,7 +2105,7 @@
           <a:p>
             <a:fld id="{769B505E-3E4C-4259-8B34-E5FA827A4AB9}" type="datetimeFigureOut">
               <a:rPr lang="es-ES" smtClean="0"/>
-              <a:t>16/01/2019</a:t>
+              <a:t>29/01/2019</a:t>
             </a:fld>
             <a:endParaRPr lang="es-ES"/>
           </a:p>
@@ -2417,7 +2418,7 @@
           <a:p>
             <a:fld id="{769B505E-3E4C-4259-8B34-E5FA827A4AB9}" type="datetimeFigureOut">
               <a:rPr lang="es-ES" smtClean="0"/>
-              <a:t>16/01/2019</a:t>
+              <a:t>29/01/2019</a:t>
             </a:fld>
             <a:endParaRPr lang="es-ES"/>
           </a:p>
@@ -2706,7 +2707,7 @@
           <a:p>
             <a:fld id="{769B505E-3E4C-4259-8B34-E5FA827A4AB9}" type="datetimeFigureOut">
               <a:rPr lang="es-ES" smtClean="0"/>
-              <a:t>16/01/2019</a:t>
+              <a:t>29/01/2019</a:t>
             </a:fld>
             <a:endParaRPr lang="es-ES"/>
           </a:p>
@@ -2949,7 +2950,7 @@
           <a:p>
             <a:fld id="{769B505E-3E4C-4259-8B34-E5FA827A4AB9}" type="datetimeFigureOut">
               <a:rPr lang="es-ES" smtClean="0"/>
-              <a:t>16/01/2019</a:t>
+              <a:t>29/01/2019</a:t>
             </a:fld>
             <a:endParaRPr lang="es-ES"/>
           </a:p>
@@ -4017,7 +4018,7 @@
 </p:sld>
 </file>
 
-<file path=ppt/slides/slide2.xml><?xml version="1.0" encoding="utf-8"?>
+<file path=ppt/slides/slide10.xml><?xml version="1.0" encoding="utf-8"?>
 <p:sld xmlns:a="http://schemas.openxmlformats.org/drawingml/2006/main" xmlns:r="http://schemas.openxmlformats.org/officeDocument/2006/relationships" xmlns:p="http://schemas.openxmlformats.org/presentationml/2006/main">
   <p:cSld>
     <p:spTree>
@@ -4048,7 +4049,7 @@
           </p:cNvPicPr>
           <p:nvPr/>
         </p:nvPicPr>
-        <p:blipFill>
+        <p:blipFill rotWithShape="1">
           <a:blip r:embed="rId2">
             <a:extLst>
               <a:ext uri="{28A0092B-C50C-407E-A947-70E740481C1C}">
@@ -4056,14 +4057,13 @@
               </a:ext>
             </a:extLst>
           </a:blip>
-          <a:stretch>
-            <a:fillRect/>
-          </a:stretch>
+          <a:srcRect l="13762" t="8486" r="13575" b="19287"/>
+          <a:stretch/>
         </p:blipFill>
         <p:spPr>
           <a:xfrm>
-            <a:off x="0" y="0"/>
-            <a:ext cx="12187092" cy="6858001"/>
+            <a:off x="0" y="1222"/>
+            <a:ext cx="12192000" cy="6856778"/>
           </a:xfrm>
           <a:prstGeom prst="rect">
             <a:avLst/>
@@ -4076,10 +4076,10 @@
       </p:pic>
       <p:sp>
         <p:nvSpPr>
-          <p:cNvPr id="6" name="Rectangle 5">
-            <a:extLst>
-              <a:ext uri="{FF2B5EF4-FFF2-40B4-BE49-F238E27FC236}">
-                <a16:creationId xmlns:a16="http://schemas.microsoft.com/office/drawing/2014/main" id="{01FB9188-6F00-4ABA-B3B7-5059A38630AB}"/>
+          <p:cNvPr id="8" name="Rectangle 7">
+            <a:extLst>
+              <a:ext uri="{FF2B5EF4-FFF2-40B4-BE49-F238E27FC236}">
+                <a16:creationId xmlns:a16="http://schemas.microsoft.com/office/drawing/2014/main" id="{DAB8CDDE-B9DE-4E57-BD4E-6DC2FB1EC0A3}"/>
               </a:ext>
             </a:extLst>
           </p:cNvPr>
@@ -4088,8 +4088,8 @@
         </p:nvSpPr>
         <p:spPr>
           <a:xfrm>
-            <a:off x="21761" y="5608291"/>
-            <a:ext cx="3156758" cy="1005840"/>
+            <a:off x="-262027" y="47975"/>
+            <a:ext cx="11987785" cy="1005840"/>
           </a:xfrm>
           <a:prstGeom prst="rect">
             <a:avLst/>
@@ -4121,156 +4121,8 @@
           <a:p>
             <a:pPr algn="ctr"/>
             <a:r>
-              <a:rPr lang="es-ES" sz="8800" dirty="0" err="1">
-                <a:ln>
-                  <a:solidFill>
-                    <a:schemeClr val="bg1"/>
-                  </a:solidFill>
-                </a:ln>
-                <a:solidFill>
-                  <a:schemeClr val="bg1">
-                    <a:lumMod val="50000"/>
-                  </a:schemeClr>
-                </a:solidFill>
-              </a:rPr>
-              <a:t>Right</a:t>
-            </a:r>
-            <a:endParaRPr lang="es-ES" sz="8800" dirty="0">
-              <a:ln>
-                <a:solidFill>
-                  <a:schemeClr val="bg1"/>
-                </a:solidFill>
-              </a:ln>
-              <a:solidFill>
-                <a:schemeClr val="bg1">
-                  <a:lumMod val="50000"/>
-                </a:schemeClr>
-              </a:solidFill>
-            </a:endParaRPr>
-          </a:p>
-        </p:txBody>
-      </p:sp>
-      <p:sp>
-        <p:nvSpPr>
-          <p:cNvPr id="7" name="Rectangle 6">
-            <a:extLst>
-              <a:ext uri="{FF2B5EF4-FFF2-40B4-BE49-F238E27FC236}">
-                <a16:creationId xmlns:a16="http://schemas.microsoft.com/office/drawing/2014/main" id="{F220EF98-F9AA-46FA-9D4F-F12AE4AC227E}"/>
-              </a:ext>
-            </a:extLst>
-          </p:cNvPr>
-          <p:cNvSpPr/>
-          <p:nvPr/>
-        </p:nvSpPr>
-        <p:spPr>
-          <a:xfrm>
-            <a:off x="8748623" y="5608291"/>
-            <a:ext cx="3472434" cy="1005840"/>
-          </a:xfrm>
-          <a:prstGeom prst="rect">
-            <a:avLst/>
-          </a:prstGeom>
-          <a:noFill/>
-          <a:ln>
-            <a:noFill/>
-          </a:ln>
-        </p:spPr>
-        <p:style>
-          <a:lnRef idx="2">
-            <a:schemeClr val="accent1">
-              <a:shade val="50000"/>
-            </a:schemeClr>
-          </a:lnRef>
-          <a:fillRef idx="1">
-            <a:schemeClr val="accent1"/>
-          </a:fillRef>
-          <a:effectRef idx="0">
-            <a:schemeClr val="accent1"/>
-          </a:effectRef>
-          <a:fontRef idx="minor">
-            <a:schemeClr val="lt1"/>
-          </a:fontRef>
-        </p:style>
-        <p:txBody>
-          <a:bodyPr rtlCol="0" anchor="ctr"/>
-          <a:lstStyle/>
-          <a:p>
-            <a:pPr algn="ctr"/>
-            <a:r>
-              <a:rPr lang="es-ES" sz="8800" dirty="0" err="1">
-                <a:ln>
-                  <a:solidFill>
-                    <a:schemeClr val="bg1"/>
-                  </a:solidFill>
-                </a:ln>
-                <a:solidFill>
-                  <a:schemeClr val="accent2"/>
-                </a:solidFill>
-              </a:rPr>
-              <a:t>Wrong</a:t>
-            </a:r>
-            <a:endParaRPr lang="es-ES" sz="8800" dirty="0">
-              <a:ln>
-                <a:solidFill>
-                  <a:schemeClr val="bg1"/>
-                </a:solidFill>
-              </a:ln>
-              <a:solidFill>
-                <a:schemeClr val="accent2"/>
-              </a:solidFill>
-            </a:endParaRPr>
-          </a:p>
-        </p:txBody>
-      </p:sp>
-      <p:sp>
-        <p:nvSpPr>
-          <p:cNvPr id="8" name="Rectangle 7">
-            <a:extLst>
-              <a:ext uri="{FF2B5EF4-FFF2-40B4-BE49-F238E27FC236}">
-                <a16:creationId xmlns:a16="http://schemas.microsoft.com/office/drawing/2014/main" id="{DAB8CDDE-B9DE-4E57-BD4E-6DC2FB1EC0A3}"/>
-              </a:ext>
-            </a:extLst>
-          </p:cNvPr>
-          <p:cNvSpPr/>
-          <p:nvPr/>
-        </p:nvSpPr>
-        <p:spPr>
-          <a:xfrm>
-            <a:off x="3786285" y="5608291"/>
-            <a:ext cx="4621810" cy="1005840"/>
-          </a:xfrm>
-          <a:prstGeom prst="rect">
-            <a:avLst/>
-          </a:prstGeom>
-          <a:noFill/>
-          <a:ln>
-            <a:noFill/>
-          </a:ln>
-        </p:spPr>
-        <p:style>
-          <a:lnRef idx="2">
-            <a:schemeClr val="accent1">
-              <a:shade val="50000"/>
-            </a:schemeClr>
-          </a:lnRef>
-          <a:fillRef idx="1">
-            <a:schemeClr val="accent1"/>
-          </a:fillRef>
-          <a:effectRef idx="0">
-            <a:schemeClr val="accent1"/>
-          </a:effectRef>
-          <a:fontRef idx="minor">
-            <a:schemeClr val="lt1"/>
-          </a:fontRef>
-        </p:style>
-        <p:txBody>
-          <a:bodyPr rtlCol="0" anchor="ctr"/>
-          <a:lstStyle/>
-          <a:p>
-            <a:pPr algn="ctr"/>
-            <a:r>
               <a:rPr lang="es-ES" sz="8800" b="1" dirty="0" err="1">
-                <a:ln>
+                <a:ln w="28575">
                   <a:solidFill>
                     <a:schemeClr val="bg1"/>
                   </a:solidFill>
@@ -4279,10 +4131,88 @@
                   <a:srgbClr val="0070C0"/>
                 </a:solidFill>
               </a:rPr>
-              <a:t>Optimum</a:t>
+              <a:t>Opti</a:t>
+            </a:r>
+            <a:r>
+              <a:rPr lang="es-ES" sz="8800" b="1" dirty="0" err="1">
+                <a:ln w="28575">
+                  <a:solidFill>
+                    <a:schemeClr val="bg1"/>
+                  </a:solidFill>
+                </a:ln>
+                <a:solidFill>
+                  <a:schemeClr val="tx1"/>
+                </a:solidFill>
+              </a:rPr>
+              <a:t>m</a:t>
+            </a:r>
+            <a:r>
+              <a:rPr lang="es-ES" sz="8800" b="1" dirty="0" err="1">
+                <a:ln w="28575">
+                  <a:solidFill>
+                    <a:schemeClr val="bg1"/>
+                  </a:solidFill>
+                </a:ln>
+                <a:solidFill>
+                  <a:srgbClr val="0070C0"/>
+                </a:solidFill>
+              </a:rPr>
+              <a:t>u</a:t>
+            </a:r>
+            <a:r>
+              <a:rPr lang="es-ES" sz="8800" b="1" dirty="0" err="1">
+                <a:ln w="28575">
+                  <a:solidFill>
+                    <a:schemeClr val="bg1"/>
+                  </a:solidFill>
+                </a:ln>
+                <a:solidFill>
+                  <a:schemeClr val="tx1"/>
+                </a:solidFill>
+              </a:rPr>
+              <a:t>m</a:t>
+            </a:r>
+            <a:r>
+              <a:rPr lang="es-ES" sz="8800" b="1" dirty="0">
+                <a:ln w="28575">
+                  <a:solidFill>
+                    <a:schemeClr val="bg1"/>
+                  </a:solidFill>
+                </a:ln>
+                <a:solidFill>
+                  <a:schemeClr val="tx1"/>
+                </a:solidFill>
+              </a:rPr>
+              <a:t> </a:t>
+            </a:r>
+            <a:r>
+              <a:rPr lang="es-ES" sz="8800" b="1" dirty="0" err="1">
+                <a:ln w="28575">
+                  <a:solidFill>
+                    <a:schemeClr val="bg1"/>
+                  </a:solidFill>
+                </a:ln>
+                <a:solidFill>
+                  <a:schemeClr val="tx1"/>
+                </a:solidFill>
+              </a:rPr>
+              <a:t>d</a:t>
+            </a:r>
+            <a:r>
+              <a:rPr lang="es-ES" sz="8800" b="1" dirty="0" err="1">
+                <a:ln w="28575">
+                  <a:solidFill>
+                    <a:schemeClr val="bg1"/>
+                  </a:solidFill>
+                </a:ln>
+                <a:solidFill>
+                  <a:srgbClr val="0070C0"/>
+                </a:solidFill>
+              </a:rPr>
+              <a:t>ecision</a:t>
             </a:r>
             <a:endParaRPr lang="es-ES" sz="8800" b="1" dirty="0">
-              <a:ln>
+              <a:ln w="28575">
                 <a:solidFill>
                   <a:schemeClr val="bg1"/>
                 </a:solidFill>
@@ -4294,10 +4224,235 @@
           </a:p>
         </p:txBody>
       </p:sp>
+      <p:pic>
+        <p:nvPicPr>
+          <p:cNvPr id="3" name="Picture 2" descr="A close up of a logo&#10;&#10;Description generated with very high confidence">
+            <a:extLst>
+              <a:ext uri="{FF2B5EF4-FFF2-40B4-BE49-F238E27FC236}">
+                <a16:creationId xmlns:a16="http://schemas.microsoft.com/office/drawing/2014/main" id="{37F1DB6C-019C-41A9-AF2C-79B5F7F26781}"/>
+              </a:ext>
+            </a:extLst>
+          </p:cNvPr>
+          <p:cNvPicPr>
+            <a:picLocks noChangeAspect="1"/>
+          </p:cNvPicPr>
+          <p:nvPr/>
+        </p:nvPicPr>
+        <p:blipFill>
+          <a:blip r:embed="rId3">
+            <a:extLst>
+              <a:ext uri="{28A0092B-C50C-407E-A947-70E740481C1C}">
+                <a14:useLocalDpi xmlns:a14="http://schemas.microsoft.com/office/drawing/2010/main" val="0"/>
+              </a:ext>
+            </a:extLst>
+          </a:blip>
+          <a:stretch>
+            <a:fillRect/>
+          </a:stretch>
+        </p:blipFill>
+        <p:spPr>
+          <a:xfrm>
+            <a:off x="10325626" y="-88886"/>
+            <a:ext cx="1700756" cy="1097814"/>
+          </a:xfrm>
+          <a:prstGeom prst="rect">
+            <a:avLst/>
+          </a:prstGeom>
+        </p:spPr>
+      </p:pic>
+      <p:sp>
+        <p:nvSpPr>
+          <p:cNvPr id="2" name="Rectangle 1">
+            <a:extLst>
+              <a:ext uri="{FF2B5EF4-FFF2-40B4-BE49-F238E27FC236}">
+                <a16:creationId xmlns:a16="http://schemas.microsoft.com/office/drawing/2014/main" id="{EB9FAF3B-04EF-49E6-9961-27EE5FB921D4}"/>
+              </a:ext>
+            </a:extLst>
+          </p:cNvPr>
+          <p:cNvSpPr/>
+          <p:nvPr/>
+        </p:nvSpPr>
+        <p:spPr>
+          <a:xfrm rot="19800000">
+            <a:off x="1902178" y="2624667"/>
+            <a:ext cx="3691466" cy="2026355"/>
+          </a:xfrm>
+          <a:prstGeom prst="rect">
+            <a:avLst/>
+          </a:prstGeom>
+        </p:spPr>
+        <p:style>
+          <a:lnRef idx="2">
+            <a:schemeClr val="accent2">
+              <a:shade val="50000"/>
+            </a:schemeClr>
+          </a:lnRef>
+          <a:fillRef idx="1">
+            <a:schemeClr val="accent2"/>
+          </a:fillRef>
+          <a:effectRef idx="0">
+            <a:schemeClr val="accent2"/>
+          </a:effectRef>
+          <a:fontRef idx="minor">
+            <a:schemeClr val="lt1"/>
+          </a:fontRef>
+        </p:style>
+        <p:txBody>
+          <a:bodyPr rtlCol="0" anchor="ctr"/>
+          <a:lstStyle/>
+          <a:p>
+            <a:pPr algn="ctr"/>
+            <a:r>
+              <a:rPr lang="es-ES" dirty="0"/>
+              <a:t>Guardar idea: </a:t>
+            </a:r>
+          </a:p>
+          <a:p>
+            <a:pPr algn="ctr"/>
+            <a:endParaRPr lang="es-ES" dirty="0"/>
+          </a:p>
+          <a:p>
+            <a:pPr algn="ctr"/>
+            <a:r>
+              <a:rPr lang="es-ES" dirty="0"/>
+              <a:t>Crear bucle de formación de palabras como en A++ = </a:t>
+            </a:r>
+            <a:r>
+              <a:rPr lang="es-ES" dirty="0" err="1"/>
+              <a:t>maxmaxdata</a:t>
+            </a:r>
+            <a:r>
+              <a:rPr lang="es-ES" dirty="0"/>
+              <a:t> = mmd</a:t>
+            </a:r>
+          </a:p>
+        </p:txBody>
+      </p:sp>
     </p:spTree>
     <p:extLst>
       <p:ext uri="{BB962C8B-B14F-4D97-AF65-F5344CB8AC3E}">
-        <p14:creationId xmlns:p14="http://schemas.microsoft.com/office/powerpoint/2010/main" val="1413896504"/>
+        <p14:creationId xmlns:p14="http://schemas.microsoft.com/office/powerpoint/2010/main" val="3156351492"/>
+      </p:ext>
+    </p:extLst>
+  </p:cSld>
+  <p:clrMapOvr>
+    <a:masterClrMapping/>
+  </p:clrMapOvr>
+</p:sld>
+</file>
+
+<file path=ppt/slides/slide2.xml><?xml version="1.0" encoding="utf-8"?>
+<p:sld xmlns:a="http://schemas.openxmlformats.org/drawingml/2006/main" xmlns:r="http://schemas.openxmlformats.org/officeDocument/2006/relationships" xmlns:p="http://schemas.openxmlformats.org/presentationml/2006/main">
+  <p:cSld>
+    <p:spTree>
+      <p:nvGrpSpPr>
+        <p:cNvPr id="1" name=""/>
+        <p:cNvGrpSpPr/>
+        <p:nvPr/>
+      </p:nvGrpSpPr>
+      <p:grpSpPr>
+        <a:xfrm>
+          <a:off x="0" y="0"/>
+          <a:ext cx="0" cy="0"/>
+          <a:chOff x="0" y="0"/>
+          <a:chExt cx="0" cy="0"/>
+        </a:xfrm>
+      </p:grpSpPr>
+      <p:grpSp>
+        <p:nvGrpSpPr>
+          <p:cNvPr id="7" name="Group 6">
+            <a:extLst>
+              <a:ext uri="{FF2B5EF4-FFF2-40B4-BE49-F238E27FC236}">
+                <a16:creationId xmlns:a16="http://schemas.microsoft.com/office/drawing/2014/main" id="{CE5DB297-88E9-4ECE-8601-FED9AD992901}"/>
+              </a:ext>
+            </a:extLst>
+          </p:cNvPr>
+          <p:cNvGrpSpPr/>
+          <p:nvPr/>
+        </p:nvGrpSpPr>
+        <p:grpSpPr>
+          <a:xfrm>
+            <a:off x="0" y="0"/>
+            <a:ext cx="13162385" cy="6858000"/>
+            <a:chOff x="0" y="0"/>
+            <a:chExt cx="13162385" cy="6858000"/>
+          </a:xfrm>
+        </p:grpSpPr>
+        <p:pic>
+          <p:nvPicPr>
+            <p:cNvPr id="5" name="Picture 4" descr="A hand holding a watch&#10;&#10;Description generated with very high confidence">
+              <a:extLst>
+                <a:ext uri="{FF2B5EF4-FFF2-40B4-BE49-F238E27FC236}">
+                  <a16:creationId xmlns:a16="http://schemas.microsoft.com/office/drawing/2014/main" id="{EED82CA9-0360-403E-96C0-C7B046F1918F}"/>
+                </a:ext>
+              </a:extLst>
+            </p:cNvPr>
+            <p:cNvPicPr>
+              <a:picLocks noChangeAspect="1"/>
+            </p:cNvPicPr>
+            <p:nvPr/>
+          </p:nvPicPr>
+          <p:blipFill rotWithShape="1">
+            <a:blip r:embed="rId2">
+              <a:extLst>
+                <a:ext uri="{28A0092B-C50C-407E-A947-70E740481C1C}">
+                  <a14:useLocalDpi xmlns:a14="http://schemas.microsoft.com/office/drawing/2010/main" val="0"/>
+                </a:ext>
+              </a:extLst>
+            </a:blip>
+            <a:srcRect l="53298"/>
+            <a:stretch/>
+          </p:blipFill>
+          <p:spPr>
+            <a:xfrm>
+              <a:off x="0" y="0"/>
+              <a:ext cx="5807838" cy="6858000"/>
+            </a:xfrm>
+            <a:prstGeom prst="rect">
+              <a:avLst/>
+            </a:prstGeom>
+          </p:spPr>
+        </p:pic>
+        <p:pic>
+          <p:nvPicPr>
+            <p:cNvPr id="6" name="Picture 5" descr="A hand holding a watch&#10;&#10;Description generated with very high confidence">
+              <a:extLst>
+                <a:ext uri="{FF2B5EF4-FFF2-40B4-BE49-F238E27FC236}">
+                  <a16:creationId xmlns:a16="http://schemas.microsoft.com/office/drawing/2014/main" id="{DE6047D3-5534-4571-B3A6-DE07E5467312}"/>
+                </a:ext>
+              </a:extLst>
+            </p:cNvPr>
+            <p:cNvPicPr>
+              <a:picLocks noChangeAspect="1"/>
+            </p:cNvPicPr>
+            <p:nvPr/>
+          </p:nvPicPr>
+          <p:blipFill rotWithShape="1">
+            <a:blip r:embed="rId2">
+              <a:extLst>
+                <a:ext uri="{28A0092B-C50C-407E-A947-70E740481C1C}">
+                  <a14:useLocalDpi xmlns:a14="http://schemas.microsoft.com/office/drawing/2010/main" val="0"/>
+                </a:ext>
+              </a:extLst>
+            </a:blip>
+            <a:srcRect r="28977"/>
+            <a:stretch/>
+          </p:blipFill>
+          <p:spPr>
+            <a:xfrm>
+              <a:off x="5807838" y="0"/>
+              <a:ext cx="7354547" cy="6858000"/>
+            </a:xfrm>
+            <a:prstGeom prst="rect">
+              <a:avLst/>
+            </a:prstGeom>
+          </p:spPr>
+        </p:pic>
+      </p:grpSp>
+    </p:spTree>
+    <p:extLst>
+      <p:ext uri="{BB962C8B-B14F-4D97-AF65-F5344CB8AC3E}">
+        <p14:creationId xmlns:p14="http://schemas.microsoft.com/office/powerpoint/2010/main" val="1973184405"/>
       </p:ext>
     </p:extLst>
   </p:cSld>
@@ -4338,7 +4493,7 @@
           </p:cNvPicPr>
           <p:nvPr/>
         </p:nvPicPr>
-        <p:blipFill rotWithShape="1">
+        <p:blipFill>
           <a:blip r:embed="rId2">
             <a:extLst>
               <a:ext uri="{28A0092B-C50C-407E-A947-70E740481C1C}">
@@ -4346,13 +4501,14 @@
               </a:ext>
             </a:extLst>
           </a:blip>
-          <a:srcRect l="13762" t="8486" r="13575" b="19287"/>
-          <a:stretch/>
+          <a:stretch>
+            <a:fillRect/>
+          </a:stretch>
         </p:blipFill>
         <p:spPr>
           <a:xfrm>
-            <a:off x="0" y="1222"/>
-            <a:ext cx="12192000" cy="6856778"/>
+            <a:off x="0" y="0"/>
+            <a:ext cx="12187092" cy="6858001"/>
           </a:xfrm>
           <a:prstGeom prst="rect">
             <a:avLst/>
@@ -4377,8 +4533,8 @@
         </p:nvSpPr>
         <p:spPr>
           <a:xfrm>
-            <a:off x="1706228" y="2278780"/>
-            <a:ext cx="5083991" cy="1005840"/>
+            <a:off x="21761" y="5608291"/>
+            <a:ext cx="3156758" cy="1005840"/>
           </a:xfrm>
           <a:prstGeom prst="rect">
             <a:avLst/>
@@ -4410,20 +4566,32 @@
           <a:p>
             <a:pPr algn="ctr"/>
             <a:r>
-              <a:rPr lang="es-ES" sz="13800" b="1" dirty="0">
-                <a:ln w="28575">
+              <a:rPr lang="es-ES" sz="8800" dirty="0" err="1">
+                <a:ln>
                   <a:solidFill>
-                    <a:sysClr val="windowText" lastClr="000000"/>
+                    <a:schemeClr val="bg1"/>
                   </a:solidFill>
                 </a:ln>
                 <a:solidFill>
                   <a:schemeClr val="bg1">
-                    <a:lumMod val="85000"/>
+                    <a:lumMod val="50000"/>
                   </a:schemeClr>
                 </a:solidFill>
               </a:rPr>
-              <a:t>Buena</a:t>
-            </a:r>
+              <a:t>Right</a:t>
+            </a:r>
+            <a:endParaRPr lang="es-ES" sz="8800" dirty="0">
+              <a:ln>
+                <a:solidFill>
+                  <a:schemeClr val="bg1"/>
+                </a:solidFill>
+              </a:ln>
+              <a:solidFill>
+                <a:schemeClr val="bg1">
+                  <a:lumMod val="50000"/>
+                </a:schemeClr>
+              </a:solidFill>
+            </a:endParaRPr>
           </a:p>
         </p:txBody>
       </p:sp>
@@ -4441,8 +4609,8 @@
         </p:nvSpPr>
         <p:spPr>
           <a:xfrm>
-            <a:off x="218214" y="209227"/>
-            <a:ext cx="4201645" cy="1005840"/>
+            <a:off x="8748623" y="5608291"/>
+            <a:ext cx="3472434" cy="1005840"/>
           </a:xfrm>
           <a:prstGeom prst="rect">
             <a:avLst/>
@@ -4474,8 +4642,8 @@
           <a:p>
             <a:pPr algn="ctr"/>
             <a:r>
-              <a:rPr lang="es-ES" sz="9000" b="1" dirty="0">
-                <a:ln w="28575">
+              <a:rPr lang="es-ES" sz="8800" dirty="0" err="1">
+                <a:ln>
                   <a:solidFill>
                     <a:schemeClr val="bg1"/>
                   </a:solidFill>
@@ -4484,8 +4652,18 @@
                   <a:schemeClr val="accent2"/>
                 </a:solidFill>
               </a:rPr>
-              <a:t>Errónea</a:t>
-            </a:r>
+              <a:t>Wrong</a:t>
+            </a:r>
+            <a:endParaRPr lang="es-ES" sz="8800" dirty="0">
+              <a:ln>
+                <a:solidFill>
+                  <a:schemeClr val="bg1"/>
+                </a:solidFill>
+              </a:ln>
+              <a:solidFill>
+                <a:schemeClr val="accent2"/>
+              </a:solidFill>
+            </a:endParaRPr>
           </a:p>
         </p:txBody>
       </p:sp>
@@ -4503,8 +4681,8 @@
         </p:nvSpPr>
         <p:spPr>
           <a:xfrm>
-            <a:off x="4076589" y="4752371"/>
-            <a:ext cx="9006600" cy="1005840"/>
+            <a:off x="3786285" y="5608291"/>
+            <a:ext cx="4621810" cy="1005840"/>
           </a:xfrm>
           <a:prstGeom prst="rect">
             <a:avLst/>
@@ -4536,8 +4714,8 @@
           <a:p>
             <a:pPr algn="ctr"/>
             <a:r>
-              <a:rPr lang="es-ES" sz="16600" b="1" dirty="0">
-                <a:ln w="28575">
+              <a:rPr lang="es-ES" sz="8800" b="1" dirty="0" err="1">
+                <a:ln>
                   <a:solidFill>
                     <a:schemeClr val="bg1"/>
                   </a:solidFill>
@@ -4546,15 +4724,25 @@
                   <a:srgbClr val="0070C0"/>
                 </a:solidFill>
               </a:rPr>
-              <a:t>Óptima</a:t>
-            </a:r>
+              <a:t>Optimum</a:t>
+            </a:r>
+            <a:endParaRPr lang="es-ES" sz="8800" b="1" dirty="0">
+              <a:ln>
+                <a:solidFill>
+                  <a:schemeClr val="bg1"/>
+                </a:solidFill>
+              </a:ln>
+              <a:solidFill>
+                <a:srgbClr val="0070C0"/>
+              </a:solidFill>
+            </a:endParaRPr>
           </a:p>
         </p:txBody>
       </p:sp>
     </p:spTree>
     <p:extLst>
       <p:ext uri="{BB962C8B-B14F-4D97-AF65-F5344CB8AC3E}">
-        <p14:creationId xmlns:p14="http://schemas.microsoft.com/office/powerpoint/2010/main" val="2614945254"/>
+        <p14:creationId xmlns:p14="http://schemas.microsoft.com/office/powerpoint/2010/main" val="1413896504"/>
       </p:ext>
     </p:extLst>
   </p:cSld>
@@ -4667,7 +4855,7 @@
           <a:p>
             <a:pPr algn="ctr"/>
             <a:r>
-              <a:rPr lang="es-ES" sz="13800" b="1" dirty="0" err="1">
+              <a:rPr lang="es-ES" sz="13800" b="1" dirty="0">
                 <a:ln w="28575">
                   <a:solidFill>
                     <a:sysClr val="windowText" lastClr="000000"/>
@@ -4679,20 +4867,8 @@
                   </a:schemeClr>
                 </a:solidFill>
               </a:rPr>
-              <a:t>right</a:t>
-            </a:r>
-            <a:endParaRPr lang="es-ES" sz="13800" b="1" dirty="0">
-              <a:ln w="28575">
-                <a:solidFill>
-                  <a:sysClr val="windowText" lastClr="000000"/>
-                </a:solidFill>
-              </a:ln>
-              <a:solidFill>
-                <a:schemeClr val="bg1">
-                  <a:lumMod val="85000"/>
-                </a:schemeClr>
-              </a:solidFill>
-            </a:endParaRPr>
+              <a:t>Buena</a:t>
+            </a:r>
           </a:p>
         </p:txBody>
       </p:sp>
@@ -4743,7 +4919,7 @@
           <a:p>
             <a:pPr algn="ctr"/>
             <a:r>
-              <a:rPr lang="es-ES" sz="9000" b="1" dirty="0" err="1">
+              <a:rPr lang="es-ES" sz="9000" b="1" dirty="0">
                 <a:ln w="28575">
                   <a:solidFill>
                     <a:schemeClr val="bg1"/>
@@ -4753,18 +4929,8 @@
                   <a:schemeClr val="accent2"/>
                 </a:solidFill>
               </a:rPr>
-              <a:t>wrong</a:t>
-            </a:r>
-            <a:endParaRPr lang="es-ES" sz="9000" b="1" dirty="0">
-              <a:ln w="28575">
-                <a:solidFill>
-                  <a:schemeClr val="bg1"/>
-                </a:solidFill>
-              </a:ln>
-              <a:solidFill>
-                <a:schemeClr val="accent2"/>
-              </a:solidFill>
-            </a:endParaRPr>
+              <a:t>Errónea</a:t>
+            </a:r>
           </a:p>
         </p:txBody>
       </p:sp>
@@ -4782,7 +4948,7 @@
         </p:nvSpPr>
         <p:spPr>
           <a:xfrm>
-            <a:off x="3513063" y="4752371"/>
+            <a:off x="4076589" y="4752371"/>
             <a:ext cx="9006600" cy="1005840"/>
           </a:xfrm>
           <a:prstGeom prst="rect">
@@ -4815,7 +4981,7 @@
           <a:p>
             <a:pPr algn="ctr"/>
             <a:r>
-              <a:rPr lang="es-ES" sz="16600" b="1" dirty="0" err="1">
+              <a:rPr lang="es-ES" sz="16600" b="1" dirty="0">
                 <a:ln w="28575">
                   <a:solidFill>
                     <a:schemeClr val="bg1"/>
@@ -4825,25 +4991,15 @@
                   <a:srgbClr val="0070C0"/>
                 </a:solidFill>
               </a:rPr>
-              <a:t>optimum</a:t>
-            </a:r>
-            <a:endParaRPr lang="es-ES" sz="16600" b="1" dirty="0">
-              <a:ln w="28575">
-                <a:solidFill>
-                  <a:schemeClr val="bg1"/>
-                </a:solidFill>
-              </a:ln>
-              <a:solidFill>
-                <a:srgbClr val="0070C0"/>
-              </a:solidFill>
-            </a:endParaRPr>
+              <a:t>Óptima</a:t>
+            </a:r>
           </a:p>
         </p:txBody>
       </p:sp>
     </p:spTree>
     <p:extLst>
       <p:ext uri="{BB962C8B-B14F-4D97-AF65-F5344CB8AC3E}">
-        <p14:creationId xmlns:p14="http://schemas.microsoft.com/office/powerpoint/2010/main" val="3478202261"/>
+        <p14:creationId xmlns:p14="http://schemas.microsoft.com/office/powerpoint/2010/main" val="2614945254"/>
       </p:ext>
     </p:extLst>
   </p:cSld>
@@ -4923,7 +5079,7 @@
         </p:nvSpPr>
         <p:spPr>
           <a:xfrm>
-            <a:off x="218214" y="2278780"/>
+            <a:off x="1706228" y="2278780"/>
             <a:ext cx="5083991" cy="1005840"/>
           </a:xfrm>
           <a:prstGeom prst="rect">
@@ -4954,6 +5110,7 @@
           <a:bodyPr rtlCol="0" anchor="ctr"/>
           <a:lstStyle/>
           <a:p>
+            <a:pPr algn="ctr"/>
             <a:r>
               <a:rPr lang="es-ES" sz="13800" b="1" dirty="0" err="1">
                 <a:ln w="28575">
@@ -5029,8 +5186,9 @@
           <a:bodyPr rtlCol="0" anchor="ctr"/>
           <a:lstStyle/>
           <a:p>
-            <a:r>
-              <a:rPr lang="es-ES" sz="11500" b="1" dirty="0" err="1">
+            <a:pPr algn="ctr"/>
+            <a:r>
+              <a:rPr lang="es-ES" sz="9000" b="1" dirty="0" err="1">
                 <a:ln w="28575">
                   <a:solidFill>
                     <a:schemeClr val="bg1"/>
@@ -5042,7 +5200,7 @@
               </a:rPr>
               <a:t>wrong</a:t>
             </a:r>
-            <a:endParaRPr lang="es-ES" sz="11500" b="1" dirty="0">
+            <a:endParaRPr lang="es-ES" sz="9000" b="1" dirty="0">
               <a:ln w="28575">
                 <a:solidFill>
                   <a:schemeClr val="bg1"/>
@@ -5069,7 +5227,7 @@
         </p:nvSpPr>
         <p:spPr>
           <a:xfrm>
-            <a:off x="218214" y="4752371"/>
+            <a:off x="3513063" y="4752371"/>
             <a:ext cx="9006600" cy="1005840"/>
           </a:xfrm>
           <a:prstGeom prst="rect">
@@ -5100,6 +5258,7 @@
           <a:bodyPr rtlCol="0" anchor="ctr"/>
           <a:lstStyle/>
           <a:p>
+            <a:pPr algn="ctr"/>
             <a:r>
               <a:rPr lang="es-ES" sz="16600" b="1" dirty="0" err="1">
                 <a:ln w="28575">
@@ -5129,7 +5288,7 @@
     </p:spTree>
     <p:extLst>
       <p:ext uri="{BB962C8B-B14F-4D97-AF65-F5344CB8AC3E}">
-        <p14:creationId xmlns:p14="http://schemas.microsoft.com/office/powerpoint/2010/main" val="3837664047"/>
+        <p14:creationId xmlns:p14="http://schemas.microsoft.com/office/powerpoint/2010/main" val="3478202261"/>
       </p:ext>
     </p:extLst>
   </p:cSld>
@@ -5209,7 +5368,7 @@
         </p:nvSpPr>
         <p:spPr>
           <a:xfrm>
-            <a:off x="3562403" y="2278780"/>
+            <a:off x="218214" y="2278780"/>
             <a:ext cx="5083991" cy="1005840"/>
           </a:xfrm>
           <a:prstGeom prst="rect">
@@ -5240,7 +5399,6 @@
           <a:bodyPr rtlCol="0" anchor="ctr"/>
           <a:lstStyle/>
           <a:p>
-            <a:pPr algn="ctr"/>
             <a:r>
               <a:rPr lang="es-ES" sz="13800" b="1" dirty="0" err="1">
                 <a:ln w="28575">
@@ -5285,7 +5443,7 @@
         </p:nvSpPr>
         <p:spPr>
           <a:xfrm>
-            <a:off x="4003576" y="209227"/>
+            <a:off x="218214" y="209227"/>
             <a:ext cx="4201645" cy="1005840"/>
           </a:xfrm>
           <a:prstGeom prst="rect">
@@ -5316,7 +5474,6 @@
           <a:bodyPr rtlCol="0" anchor="ctr"/>
           <a:lstStyle/>
           <a:p>
-            <a:pPr algn="ctr"/>
             <a:r>
               <a:rPr lang="es-ES" sz="11500" b="1" dirty="0" err="1">
                 <a:ln w="28575">
@@ -5357,7 +5514,7 @@
         </p:nvSpPr>
         <p:spPr>
           <a:xfrm>
-            <a:off x="1601098" y="4752371"/>
+            <a:off x="218214" y="4752371"/>
             <a:ext cx="9006600" cy="1005840"/>
           </a:xfrm>
           <a:prstGeom prst="rect">
@@ -5388,7 +5545,6 @@
           <a:bodyPr rtlCol="0" anchor="ctr"/>
           <a:lstStyle/>
           <a:p>
-            <a:pPr algn="ctr"/>
             <a:r>
               <a:rPr lang="es-ES" sz="16600" b="1" dirty="0" err="1">
                 <a:ln w="28575">
@@ -5418,7 +5574,7 @@
     </p:spTree>
     <p:extLst>
       <p:ext uri="{BB962C8B-B14F-4D97-AF65-F5344CB8AC3E}">
-        <p14:creationId xmlns:p14="http://schemas.microsoft.com/office/powerpoint/2010/main" val="1658508387"/>
+        <p14:creationId xmlns:p14="http://schemas.microsoft.com/office/powerpoint/2010/main" val="3837664047"/>
       </p:ext>
     </p:extLst>
   </p:cSld>
@@ -5472,7 +5628,7 @@
         </p:blipFill>
         <p:spPr>
           <a:xfrm>
-            <a:off x="0" y="6403"/>
+            <a:off x="0" y="1222"/>
             <a:ext cx="12192000" cy="6856778"/>
           </a:xfrm>
           <a:prstGeom prst="rect">
@@ -5498,7 +5654,7 @@
         </p:nvSpPr>
         <p:spPr>
           <a:xfrm>
-            <a:off x="3376979" y="2797656"/>
+            <a:off x="3562403" y="2278780"/>
             <a:ext cx="5083991" cy="1005840"/>
           </a:xfrm>
           <a:prstGeom prst="rect">
@@ -5531,7 +5687,7 @@
           <a:p>
             <a:pPr algn="ctr"/>
             <a:r>
-              <a:rPr lang="es-ES" sz="10000" b="1" dirty="0" err="1">
+              <a:rPr lang="es-ES" sz="13800" b="1" dirty="0" err="1">
                 <a:ln w="28575">
                   <a:solidFill>
                     <a:sysClr val="windowText" lastClr="000000"/>
@@ -5539,13 +5695,13 @@
                 </a:ln>
                 <a:solidFill>
                   <a:schemeClr val="bg1">
-                    <a:lumMod val="75000"/>
+                    <a:lumMod val="85000"/>
                   </a:schemeClr>
                 </a:solidFill>
               </a:rPr>
               <a:t>right</a:t>
             </a:r>
-            <a:endParaRPr lang="es-ES" sz="10000" b="1" dirty="0">
+            <a:endParaRPr lang="es-ES" sz="13800" b="1" dirty="0">
               <a:ln w="28575">
                 <a:solidFill>
                   <a:sysClr val="windowText" lastClr="000000"/>
@@ -5553,7 +5709,7 @@
               </a:ln>
               <a:solidFill>
                 <a:schemeClr val="bg1">
-                  <a:lumMod val="75000"/>
+                  <a:lumMod val="85000"/>
                 </a:schemeClr>
               </a:solidFill>
             </a:endParaRPr>
@@ -5574,7 +5730,7 @@
         </p:nvSpPr>
         <p:spPr>
           <a:xfrm>
-            <a:off x="585107" y="72773"/>
+            <a:off x="4003576" y="209227"/>
             <a:ext cx="4201645" cy="1005840"/>
           </a:xfrm>
           <a:prstGeom prst="rect">
@@ -5607,10 +5763,10 @@
           <a:p>
             <a:pPr algn="ctr"/>
             <a:r>
-              <a:rPr lang="es-ES" sz="10000" b="1" dirty="0" err="1">
+              <a:rPr lang="es-ES" sz="11500" b="1" dirty="0" err="1">
                 <a:ln w="28575">
                   <a:solidFill>
-                    <a:sysClr val="windowText" lastClr="000000"/>
+                    <a:schemeClr val="bg1"/>
                   </a:solidFill>
                 </a:ln>
                 <a:solidFill>
@@ -5619,10 +5775,10 @@
               </a:rPr>
               <a:t>wrong</a:t>
             </a:r>
-            <a:endParaRPr lang="es-ES" sz="10000" b="1" dirty="0">
+            <a:endParaRPr lang="es-ES" sz="11500" b="1" dirty="0">
               <a:ln w="28575">
                 <a:solidFill>
-                  <a:sysClr val="windowText" lastClr="000000"/>
+                  <a:schemeClr val="bg1"/>
                 </a:solidFill>
               </a:ln>
               <a:solidFill>
@@ -5646,7 +5802,7 @@
         </p:nvSpPr>
         <p:spPr>
           <a:xfrm>
-            <a:off x="4574225" y="5412766"/>
+            <a:off x="1601098" y="4752371"/>
             <a:ext cx="9006600" cy="1005840"/>
           </a:xfrm>
           <a:prstGeom prst="rect">
@@ -5679,7 +5835,7 @@
           <a:p>
             <a:pPr algn="ctr"/>
             <a:r>
-              <a:rPr lang="es-ES" sz="12000" b="1" dirty="0" err="1">
+              <a:rPr lang="es-ES" sz="16600" b="1" dirty="0" err="1">
                 <a:ln w="28575">
                   <a:solidFill>
                     <a:schemeClr val="bg1"/>
@@ -5691,7 +5847,7 @@
               </a:rPr>
               <a:t>optimum</a:t>
             </a:r>
-            <a:endParaRPr lang="es-ES" sz="12000" b="1" dirty="0">
+            <a:endParaRPr lang="es-ES" sz="16600" b="1" dirty="0">
               <a:ln w="28575">
                 <a:solidFill>
                   <a:schemeClr val="bg1"/>
@@ -5704,172 +5860,10 @@
           </a:p>
         </p:txBody>
       </p:sp>
-      <p:sp>
-        <p:nvSpPr>
-          <p:cNvPr id="2" name="Rectangle 1">
-            <a:extLst>
-              <a:ext uri="{FF2B5EF4-FFF2-40B4-BE49-F238E27FC236}">
-                <a16:creationId xmlns:a16="http://schemas.microsoft.com/office/drawing/2014/main" id="{3D503427-208D-4458-81C1-6868343BDF96}"/>
-              </a:ext>
-            </a:extLst>
-          </p:cNvPr>
-          <p:cNvSpPr/>
-          <p:nvPr/>
-        </p:nvSpPr>
-        <p:spPr>
-          <a:xfrm>
-            <a:off x="73378" y="79633"/>
-            <a:ext cx="5472000" cy="1265028"/>
-          </a:xfrm>
-          <a:prstGeom prst="rect">
-            <a:avLst/>
-          </a:prstGeom>
-          <a:solidFill>
-            <a:schemeClr val="tx1">
-              <a:alpha val="12000"/>
-            </a:schemeClr>
-          </a:solidFill>
-          <a:ln>
-            <a:noFill/>
-          </a:ln>
-        </p:spPr>
-        <p:style>
-          <a:lnRef idx="2">
-            <a:schemeClr val="accent1">
-              <a:shade val="50000"/>
-            </a:schemeClr>
-          </a:lnRef>
-          <a:fillRef idx="1">
-            <a:schemeClr val="accent1"/>
-          </a:fillRef>
-          <a:effectRef idx="0">
-            <a:schemeClr val="accent1"/>
-          </a:effectRef>
-          <a:fontRef idx="minor">
-            <a:schemeClr val="lt1"/>
-          </a:fontRef>
-        </p:style>
-        <p:txBody>
-          <a:bodyPr rtlCol="0" anchor="ctr"/>
-          <a:lstStyle/>
-          <a:p>
-            <a:pPr algn="ctr"/>
-            <a:endParaRPr lang="es-ES" sz="2000"/>
-          </a:p>
-        </p:txBody>
-      </p:sp>
-      <p:sp>
-        <p:nvSpPr>
-          <p:cNvPr id="9" name="Rectangle 8">
-            <a:extLst>
-              <a:ext uri="{FF2B5EF4-FFF2-40B4-BE49-F238E27FC236}">
-                <a16:creationId xmlns:a16="http://schemas.microsoft.com/office/drawing/2014/main" id="{9F28ACAD-F808-49B2-8223-D4B3789611E5}"/>
-              </a:ext>
-            </a:extLst>
-          </p:cNvPr>
-          <p:cNvSpPr/>
-          <p:nvPr/>
-        </p:nvSpPr>
-        <p:spPr>
-          <a:xfrm>
-            <a:off x="4131996" y="2753468"/>
-            <a:ext cx="3482360" cy="1265028"/>
-          </a:xfrm>
-          <a:prstGeom prst="rect">
-            <a:avLst/>
-          </a:prstGeom>
-          <a:solidFill>
-            <a:schemeClr val="tx1">
-              <a:alpha val="12000"/>
-            </a:schemeClr>
-          </a:solidFill>
-          <a:ln>
-            <a:noFill/>
-          </a:ln>
-        </p:spPr>
-        <p:style>
-          <a:lnRef idx="2">
-            <a:schemeClr val="accent1">
-              <a:shade val="50000"/>
-            </a:schemeClr>
-          </a:lnRef>
-          <a:fillRef idx="1">
-            <a:schemeClr val="accent1"/>
-          </a:fillRef>
-          <a:effectRef idx="0">
-            <a:schemeClr val="accent1"/>
-          </a:effectRef>
-          <a:fontRef idx="minor">
-            <a:schemeClr val="lt1"/>
-          </a:fontRef>
-        </p:style>
-        <p:txBody>
-          <a:bodyPr rtlCol="0" anchor="ctr"/>
-          <a:lstStyle/>
-          <a:p>
-            <a:pPr algn="ctr"/>
-            <a:endParaRPr lang="es-ES"/>
-          </a:p>
-        </p:txBody>
-      </p:sp>
-      <p:sp>
-        <p:nvSpPr>
-          <p:cNvPr id="10" name="Rectangle 9">
-            <a:extLst>
-              <a:ext uri="{FF2B5EF4-FFF2-40B4-BE49-F238E27FC236}">
-                <a16:creationId xmlns:a16="http://schemas.microsoft.com/office/drawing/2014/main" id="{DF4EE7FF-A433-4AE2-8D39-181F3AFB1423}"/>
-              </a:ext>
-            </a:extLst>
-          </p:cNvPr>
-          <p:cNvSpPr/>
-          <p:nvPr/>
-        </p:nvSpPr>
-        <p:spPr>
-          <a:xfrm>
-            <a:off x="5971822" y="5427302"/>
-            <a:ext cx="6094273" cy="1265028"/>
-          </a:xfrm>
-          <a:prstGeom prst="rect">
-            <a:avLst/>
-          </a:prstGeom>
-          <a:solidFill>
-            <a:schemeClr val="tx1">
-              <a:alpha val="12000"/>
-            </a:schemeClr>
-          </a:solidFill>
-          <a:ln>
-            <a:noFill/>
-          </a:ln>
-        </p:spPr>
-        <p:style>
-          <a:lnRef idx="2">
-            <a:schemeClr val="accent1">
-              <a:shade val="50000"/>
-            </a:schemeClr>
-          </a:lnRef>
-          <a:fillRef idx="1">
-            <a:schemeClr val="accent1"/>
-          </a:fillRef>
-          <a:effectRef idx="0">
-            <a:schemeClr val="accent1"/>
-          </a:effectRef>
-          <a:fontRef idx="minor">
-            <a:schemeClr val="lt1"/>
-          </a:fontRef>
-        </p:style>
-        <p:txBody>
-          <a:bodyPr rtlCol="0" anchor="ctr"/>
-          <a:lstStyle/>
-          <a:p>
-            <a:pPr algn="ctr"/>
-            <a:endParaRPr lang="es-ES" sz="2000"/>
-          </a:p>
-        </p:txBody>
-      </p:sp>
     </p:spTree>
     <p:extLst>
       <p:ext uri="{BB962C8B-B14F-4D97-AF65-F5344CB8AC3E}">
-        <p14:creationId xmlns:p14="http://schemas.microsoft.com/office/powerpoint/2010/main" val="419066415"/>
+        <p14:creationId xmlns:p14="http://schemas.microsoft.com/office/powerpoint/2010/main" val="1658508387"/>
       </p:ext>
     </p:extLst>
   </p:cSld>
@@ -5923,7 +5917,7 @@
         </p:blipFill>
         <p:spPr>
           <a:xfrm>
-            <a:off x="0" y="1222"/>
+            <a:off x="0" y="6403"/>
             <a:ext cx="12192000" cy="6856778"/>
           </a:xfrm>
           <a:prstGeom prst="rect">
@@ -5949,8 +5943,8 @@
         </p:nvSpPr>
         <p:spPr>
           <a:xfrm>
-            <a:off x="3308203" y="2024784"/>
-            <a:ext cx="5592390" cy="1005840"/>
+            <a:off x="3376979" y="2797656"/>
+            <a:ext cx="5083991" cy="1005840"/>
           </a:xfrm>
           <a:prstGeom prst="rect">
             <a:avLst/>
@@ -5982,7 +5976,7 @@
           <a:p>
             <a:pPr algn="ctr"/>
             <a:r>
-              <a:rPr lang="es-ES" sz="19900" b="1" dirty="0" err="1">
+              <a:rPr lang="es-ES" sz="10000" b="1" dirty="0" err="1">
                 <a:ln w="28575">
                   <a:solidFill>
                     <a:sysClr val="windowText" lastClr="000000"/>
@@ -5990,13 +5984,13 @@
                 </a:ln>
                 <a:solidFill>
                   <a:schemeClr val="bg1">
-                    <a:lumMod val="85000"/>
+                    <a:lumMod val="75000"/>
                   </a:schemeClr>
                 </a:solidFill>
               </a:rPr>
               <a:t>right</a:t>
             </a:r>
-            <a:endParaRPr lang="es-ES" sz="19900" b="1" dirty="0">
+            <a:endParaRPr lang="es-ES" sz="10000" b="1" dirty="0">
               <a:ln w="28575">
                 <a:solidFill>
                   <a:sysClr val="windowText" lastClr="000000"/>
@@ -6004,7 +5998,7 @@
               </a:ln>
               <a:solidFill>
                 <a:schemeClr val="bg1">
-                  <a:lumMod val="85000"/>
+                  <a:lumMod val="75000"/>
                 </a:schemeClr>
               </a:solidFill>
             </a:endParaRPr>
@@ -6025,7 +6019,7 @@
         </p:nvSpPr>
         <p:spPr>
           <a:xfrm>
-            <a:off x="4003576" y="209227"/>
+            <a:off x="585107" y="72773"/>
             <a:ext cx="4201645" cy="1005840"/>
           </a:xfrm>
           <a:prstGeom prst="rect">
@@ -6058,7 +6052,7 @@
           <a:p>
             <a:pPr algn="ctr"/>
             <a:r>
-              <a:rPr lang="es-ES" sz="9600" b="1" dirty="0" err="1">
+              <a:rPr lang="es-ES" sz="10000" b="1" dirty="0" err="1">
                 <a:ln w="28575">
                   <a:solidFill>
                     <a:sysClr val="windowText" lastClr="000000"/>
@@ -6070,7 +6064,7 @@
               </a:rPr>
               <a:t>wrong</a:t>
             </a:r>
-            <a:endParaRPr lang="es-ES" sz="9600" b="1" dirty="0">
+            <a:endParaRPr lang="es-ES" sz="10000" b="1" dirty="0">
               <a:ln w="28575">
                 <a:solidFill>
                   <a:sysClr val="windowText" lastClr="000000"/>
@@ -6097,8 +6091,8 @@
         </p:nvSpPr>
         <p:spPr>
           <a:xfrm>
-            <a:off x="110506" y="4752371"/>
-            <a:ext cx="11987785" cy="1005840"/>
+            <a:off x="4574225" y="5412766"/>
+            <a:ext cx="9006600" cy="1005840"/>
           </a:xfrm>
           <a:prstGeom prst="rect">
             <a:avLst/>
@@ -6130,7 +6124,7 @@
           <a:p>
             <a:pPr algn="ctr"/>
             <a:r>
-              <a:rPr lang="es-ES" sz="23900" b="1" dirty="0" err="1">
+              <a:rPr lang="es-ES" sz="12000" b="1" dirty="0" err="1">
                 <a:ln w="28575">
                   <a:solidFill>
                     <a:schemeClr val="bg1"/>
@@ -6142,7 +6136,7 @@
               </a:rPr>
               <a:t>optimum</a:t>
             </a:r>
-            <a:endParaRPr lang="es-ES" sz="23900" b="1" dirty="0">
+            <a:endParaRPr lang="es-ES" sz="12000" b="1" dirty="0">
               <a:ln w="28575">
                 <a:solidFill>
                   <a:schemeClr val="bg1"/>
@@ -6155,46 +6149,172 @@
           </a:p>
         </p:txBody>
       </p:sp>
-      <p:pic>
-        <p:nvPicPr>
-          <p:cNvPr id="3" name="Picture 2" descr="A close up of a logo&#10;&#10;Description generated with very high confidence">
-            <a:extLst>
-              <a:ext uri="{FF2B5EF4-FFF2-40B4-BE49-F238E27FC236}">
-                <a16:creationId xmlns:a16="http://schemas.microsoft.com/office/drawing/2014/main" id="{37F1DB6C-019C-41A9-AF2C-79B5F7F26781}"/>
-              </a:ext>
-            </a:extLst>
-          </p:cNvPr>
-          <p:cNvPicPr>
-            <a:picLocks noChangeAspect="1"/>
-          </p:cNvPicPr>
+      <p:sp>
+        <p:nvSpPr>
+          <p:cNvPr id="2" name="Rectangle 1">
+            <a:extLst>
+              <a:ext uri="{FF2B5EF4-FFF2-40B4-BE49-F238E27FC236}">
+                <a16:creationId xmlns:a16="http://schemas.microsoft.com/office/drawing/2014/main" id="{3D503427-208D-4458-81C1-6868343BDF96}"/>
+              </a:ext>
+            </a:extLst>
+          </p:cNvPr>
+          <p:cNvSpPr/>
           <p:nvPr/>
-        </p:nvPicPr>
-        <p:blipFill>
-          <a:blip r:embed="rId3">
-            <a:extLst>
-              <a:ext uri="{28A0092B-C50C-407E-A947-70E740481C1C}">
-                <a14:useLocalDpi xmlns:a14="http://schemas.microsoft.com/office/drawing/2010/main" val="0"/>
-              </a:ext>
-            </a:extLst>
-          </a:blip>
-          <a:stretch>
-            <a:fillRect/>
-          </a:stretch>
-        </p:blipFill>
-        <p:spPr>
-          <a:xfrm>
-            <a:off x="10325626" y="-88886"/>
-            <a:ext cx="1700756" cy="1097814"/>
+        </p:nvSpPr>
+        <p:spPr>
+          <a:xfrm>
+            <a:off x="73378" y="79633"/>
+            <a:ext cx="5472000" cy="1265028"/>
           </a:xfrm>
           <a:prstGeom prst="rect">
             <a:avLst/>
           </a:prstGeom>
-        </p:spPr>
-      </p:pic>
+          <a:solidFill>
+            <a:schemeClr val="tx1">
+              <a:alpha val="12000"/>
+            </a:schemeClr>
+          </a:solidFill>
+          <a:ln>
+            <a:noFill/>
+          </a:ln>
+        </p:spPr>
+        <p:style>
+          <a:lnRef idx="2">
+            <a:schemeClr val="accent1">
+              <a:shade val="50000"/>
+            </a:schemeClr>
+          </a:lnRef>
+          <a:fillRef idx="1">
+            <a:schemeClr val="accent1"/>
+          </a:fillRef>
+          <a:effectRef idx="0">
+            <a:schemeClr val="accent1"/>
+          </a:effectRef>
+          <a:fontRef idx="minor">
+            <a:schemeClr val="lt1"/>
+          </a:fontRef>
+        </p:style>
+        <p:txBody>
+          <a:bodyPr rtlCol="0" anchor="ctr"/>
+          <a:lstStyle/>
+          <a:p>
+            <a:pPr algn="ctr"/>
+            <a:endParaRPr lang="es-ES" sz="2000"/>
+          </a:p>
+        </p:txBody>
+      </p:sp>
+      <p:sp>
+        <p:nvSpPr>
+          <p:cNvPr id="9" name="Rectangle 8">
+            <a:extLst>
+              <a:ext uri="{FF2B5EF4-FFF2-40B4-BE49-F238E27FC236}">
+                <a16:creationId xmlns:a16="http://schemas.microsoft.com/office/drawing/2014/main" id="{9F28ACAD-F808-49B2-8223-D4B3789611E5}"/>
+              </a:ext>
+            </a:extLst>
+          </p:cNvPr>
+          <p:cNvSpPr/>
+          <p:nvPr/>
+        </p:nvSpPr>
+        <p:spPr>
+          <a:xfrm>
+            <a:off x="4131996" y="2753468"/>
+            <a:ext cx="3482360" cy="1265028"/>
+          </a:xfrm>
+          <a:prstGeom prst="rect">
+            <a:avLst/>
+          </a:prstGeom>
+          <a:solidFill>
+            <a:schemeClr val="tx1">
+              <a:alpha val="12000"/>
+            </a:schemeClr>
+          </a:solidFill>
+          <a:ln>
+            <a:noFill/>
+          </a:ln>
+        </p:spPr>
+        <p:style>
+          <a:lnRef idx="2">
+            <a:schemeClr val="accent1">
+              <a:shade val="50000"/>
+            </a:schemeClr>
+          </a:lnRef>
+          <a:fillRef idx="1">
+            <a:schemeClr val="accent1"/>
+          </a:fillRef>
+          <a:effectRef idx="0">
+            <a:schemeClr val="accent1"/>
+          </a:effectRef>
+          <a:fontRef idx="minor">
+            <a:schemeClr val="lt1"/>
+          </a:fontRef>
+        </p:style>
+        <p:txBody>
+          <a:bodyPr rtlCol="0" anchor="ctr"/>
+          <a:lstStyle/>
+          <a:p>
+            <a:pPr algn="ctr"/>
+            <a:endParaRPr lang="es-ES"/>
+          </a:p>
+        </p:txBody>
+      </p:sp>
+      <p:sp>
+        <p:nvSpPr>
+          <p:cNvPr id="10" name="Rectangle 9">
+            <a:extLst>
+              <a:ext uri="{FF2B5EF4-FFF2-40B4-BE49-F238E27FC236}">
+                <a16:creationId xmlns:a16="http://schemas.microsoft.com/office/drawing/2014/main" id="{DF4EE7FF-A433-4AE2-8D39-181F3AFB1423}"/>
+              </a:ext>
+            </a:extLst>
+          </p:cNvPr>
+          <p:cNvSpPr/>
+          <p:nvPr/>
+        </p:nvSpPr>
+        <p:spPr>
+          <a:xfrm>
+            <a:off x="5971822" y="5427302"/>
+            <a:ext cx="6094273" cy="1265028"/>
+          </a:xfrm>
+          <a:prstGeom prst="rect">
+            <a:avLst/>
+          </a:prstGeom>
+          <a:solidFill>
+            <a:schemeClr val="tx1">
+              <a:alpha val="12000"/>
+            </a:schemeClr>
+          </a:solidFill>
+          <a:ln>
+            <a:noFill/>
+          </a:ln>
+        </p:spPr>
+        <p:style>
+          <a:lnRef idx="2">
+            <a:schemeClr val="accent1">
+              <a:shade val="50000"/>
+            </a:schemeClr>
+          </a:lnRef>
+          <a:fillRef idx="1">
+            <a:schemeClr val="accent1"/>
+          </a:fillRef>
+          <a:effectRef idx="0">
+            <a:schemeClr val="accent1"/>
+          </a:effectRef>
+          <a:fontRef idx="minor">
+            <a:schemeClr val="lt1"/>
+          </a:fontRef>
+        </p:style>
+        <p:txBody>
+          <a:bodyPr rtlCol="0" anchor="ctr"/>
+          <a:lstStyle/>
+          <a:p>
+            <a:pPr algn="ctr"/>
+            <a:endParaRPr lang="es-ES" sz="2000"/>
+          </a:p>
+        </p:txBody>
+      </p:sp>
     </p:spTree>
     <p:extLst>
       <p:ext uri="{BB962C8B-B14F-4D97-AF65-F5344CB8AC3E}">
-        <p14:creationId xmlns:p14="http://schemas.microsoft.com/office/powerpoint/2010/main" val="1193875847"/>
+        <p14:creationId xmlns:p14="http://schemas.microsoft.com/office/powerpoint/2010/main" val="419066415"/>
       </p:ext>
     </p:extLst>
   </p:cSld>
@@ -6262,10 +6382,10 @@
       </p:pic>
       <p:sp>
         <p:nvSpPr>
-          <p:cNvPr id="8" name="Rectangle 7">
-            <a:extLst>
-              <a:ext uri="{FF2B5EF4-FFF2-40B4-BE49-F238E27FC236}">
-                <a16:creationId xmlns:a16="http://schemas.microsoft.com/office/drawing/2014/main" id="{DAB8CDDE-B9DE-4E57-BD4E-6DC2FB1EC0A3}"/>
+          <p:cNvPr id="6" name="Rectangle 5">
+            <a:extLst>
+              <a:ext uri="{FF2B5EF4-FFF2-40B4-BE49-F238E27FC236}">
+                <a16:creationId xmlns:a16="http://schemas.microsoft.com/office/drawing/2014/main" id="{01FB9188-6F00-4ABA-B3B7-5059A38630AB}"/>
               </a:ext>
             </a:extLst>
           </p:cNvPr>
@@ -6274,8 +6394,8 @@
         </p:nvSpPr>
         <p:spPr>
           <a:xfrm>
-            <a:off x="-262027" y="47975"/>
-            <a:ext cx="11987785" cy="1005840"/>
+            <a:off x="3308203" y="2024784"/>
+            <a:ext cx="5592390" cy="1005840"/>
           </a:xfrm>
           <a:prstGeom prst="rect">
             <a:avLst/>
@@ -6307,7 +6427,155 @@
           <a:p>
             <a:pPr algn="ctr"/>
             <a:r>
-              <a:rPr lang="es-ES" sz="8800" b="1" dirty="0" err="1">
+              <a:rPr lang="es-ES" sz="19900" b="1" dirty="0" err="1">
+                <a:ln w="28575">
+                  <a:solidFill>
+                    <a:sysClr val="windowText" lastClr="000000"/>
+                  </a:solidFill>
+                </a:ln>
+                <a:solidFill>
+                  <a:schemeClr val="bg1">
+                    <a:lumMod val="85000"/>
+                  </a:schemeClr>
+                </a:solidFill>
+              </a:rPr>
+              <a:t>right</a:t>
+            </a:r>
+            <a:endParaRPr lang="es-ES" sz="19900" b="1" dirty="0">
+              <a:ln w="28575">
+                <a:solidFill>
+                  <a:sysClr val="windowText" lastClr="000000"/>
+                </a:solidFill>
+              </a:ln>
+              <a:solidFill>
+                <a:schemeClr val="bg1">
+                  <a:lumMod val="85000"/>
+                </a:schemeClr>
+              </a:solidFill>
+            </a:endParaRPr>
+          </a:p>
+        </p:txBody>
+      </p:sp>
+      <p:sp>
+        <p:nvSpPr>
+          <p:cNvPr id="7" name="Rectangle 6">
+            <a:extLst>
+              <a:ext uri="{FF2B5EF4-FFF2-40B4-BE49-F238E27FC236}">
+                <a16:creationId xmlns:a16="http://schemas.microsoft.com/office/drawing/2014/main" id="{F220EF98-F9AA-46FA-9D4F-F12AE4AC227E}"/>
+              </a:ext>
+            </a:extLst>
+          </p:cNvPr>
+          <p:cNvSpPr/>
+          <p:nvPr/>
+        </p:nvSpPr>
+        <p:spPr>
+          <a:xfrm>
+            <a:off x="4003576" y="209227"/>
+            <a:ext cx="4201645" cy="1005840"/>
+          </a:xfrm>
+          <a:prstGeom prst="rect">
+            <a:avLst/>
+          </a:prstGeom>
+          <a:noFill/>
+          <a:ln>
+            <a:noFill/>
+          </a:ln>
+        </p:spPr>
+        <p:style>
+          <a:lnRef idx="2">
+            <a:schemeClr val="accent1">
+              <a:shade val="50000"/>
+            </a:schemeClr>
+          </a:lnRef>
+          <a:fillRef idx="1">
+            <a:schemeClr val="accent1"/>
+          </a:fillRef>
+          <a:effectRef idx="0">
+            <a:schemeClr val="accent1"/>
+          </a:effectRef>
+          <a:fontRef idx="minor">
+            <a:schemeClr val="lt1"/>
+          </a:fontRef>
+        </p:style>
+        <p:txBody>
+          <a:bodyPr rtlCol="0" anchor="ctr"/>
+          <a:lstStyle/>
+          <a:p>
+            <a:pPr algn="ctr"/>
+            <a:r>
+              <a:rPr lang="es-ES" sz="9600" b="1" dirty="0" err="1">
+                <a:ln w="28575">
+                  <a:solidFill>
+                    <a:sysClr val="windowText" lastClr="000000"/>
+                  </a:solidFill>
+                </a:ln>
+                <a:solidFill>
+                  <a:schemeClr val="accent2"/>
+                </a:solidFill>
+              </a:rPr>
+              <a:t>wrong</a:t>
+            </a:r>
+            <a:endParaRPr lang="es-ES" sz="9600" b="1" dirty="0">
+              <a:ln w="28575">
+                <a:solidFill>
+                  <a:sysClr val="windowText" lastClr="000000"/>
+                </a:solidFill>
+              </a:ln>
+              <a:solidFill>
+                <a:schemeClr val="accent2"/>
+              </a:solidFill>
+            </a:endParaRPr>
+          </a:p>
+        </p:txBody>
+      </p:sp>
+      <p:sp>
+        <p:nvSpPr>
+          <p:cNvPr id="8" name="Rectangle 7">
+            <a:extLst>
+              <a:ext uri="{FF2B5EF4-FFF2-40B4-BE49-F238E27FC236}">
+                <a16:creationId xmlns:a16="http://schemas.microsoft.com/office/drawing/2014/main" id="{DAB8CDDE-B9DE-4E57-BD4E-6DC2FB1EC0A3}"/>
+              </a:ext>
+            </a:extLst>
+          </p:cNvPr>
+          <p:cNvSpPr/>
+          <p:nvPr/>
+        </p:nvSpPr>
+        <p:spPr>
+          <a:xfrm>
+            <a:off x="110506" y="4752371"/>
+            <a:ext cx="11987785" cy="1005840"/>
+          </a:xfrm>
+          <a:prstGeom prst="rect">
+            <a:avLst/>
+          </a:prstGeom>
+          <a:noFill/>
+          <a:ln>
+            <a:noFill/>
+          </a:ln>
+        </p:spPr>
+        <p:style>
+          <a:lnRef idx="2">
+            <a:schemeClr val="accent1">
+              <a:shade val="50000"/>
+            </a:schemeClr>
+          </a:lnRef>
+          <a:fillRef idx="1">
+            <a:schemeClr val="accent1"/>
+          </a:fillRef>
+          <a:effectRef idx="0">
+            <a:schemeClr val="accent1"/>
+          </a:effectRef>
+          <a:fontRef idx="minor">
+            <a:schemeClr val="lt1"/>
+          </a:fontRef>
+        </p:style>
+        <p:txBody>
+          <a:bodyPr rtlCol="0" anchor="ctr"/>
+          <a:lstStyle/>
+          <a:p>
+            <a:pPr algn="ctr"/>
+            <a:r>
+              <a:rPr lang="es-ES" sz="23900" b="1" dirty="0" err="1">
                 <a:ln w="28575">
                   <a:solidFill>
                     <a:schemeClr val="bg1"/>
@@ -6317,87 +6585,9 @@
                   <a:srgbClr val="0070C0"/>
                 </a:solidFill>
               </a:rPr>
-              <a:t>Opti</a:t>
-            </a:r>
-            <a:r>
-              <a:rPr lang="es-ES" sz="8800" b="1" dirty="0" err="1">
-                <a:ln w="28575">
-                  <a:solidFill>
-                    <a:schemeClr val="bg1"/>
-                  </a:solidFill>
-                </a:ln>
-                <a:solidFill>
-                  <a:schemeClr val="tx1"/>
-                </a:solidFill>
-              </a:rPr>
-              <a:t>m</a:t>
-            </a:r>
-            <a:r>
-              <a:rPr lang="es-ES" sz="8800" b="1" dirty="0" err="1">
-                <a:ln w="28575">
-                  <a:solidFill>
-                    <a:schemeClr val="bg1"/>
-                  </a:solidFill>
-                </a:ln>
-                <a:solidFill>
-                  <a:srgbClr val="0070C0"/>
-                </a:solidFill>
-              </a:rPr>
-              <a:t>u</a:t>
-            </a:r>
-            <a:r>
-              <a:rPr lang="es-ES" sz="8800" b="1" dirty="0" err="1">
-                <a:ln w="28575">
-                  <a:solidFill>
-                    <a:schemeClr val="bg1"/>
-                  </a:solidFill>
-                </a:ln>
-                <a:solidFill>
-                  <a:schemeClr val="tx1"/>
-                </a:solidFill>
-              </a:rPr>
-              <a:t>m</a:t>
-            </a:r>
-            <a:r>
-              <a:rPr lang="es-ES" sz="8800" b="1" dirty="0">
-                <a:ln w="28575">
-                  <a:solidFill>
-                    <a:schemeClr val="bg1"/>
-                  </a:solidFill>
-                </a:ln>
-                <a:solidFill>
-                  <a:schemeClr val="tx1"/>
-                </a:solidFill>
-              </a:rPr>
-              <a:t> </a:t>
-            </a:r>
-            <a:r>
-              <a:rPr lang="es-ES" sz="8800" b="1" dirty="0" err="1">
-                <a:ln w="28575">
-                  <a:solidFill>
-                    <a:schemeClr val="bg1"/>
-                  </a:solidFill>
-                </a:ln>
-                <a:solidFill>
-                  <a:schemeClr val="tx1"/>
-                </a:solidFill>
-              </a:rPr>
-              <a:t>d</a:t>
-            </a:r>
-            <a:r>
-              <a:rPr lang="es-ES" sz="8800" b="1" dirty="0" err="1">
-                <a:ln w="28575">
-                  <a:solidFill>
-                    <a:schemeClr val="bg1"/>
-                  </a:solidFill>
-                </a:ln>
-                <a:solidFill>
-                  <a:srgbClr val="0070C0"/>
-                </a:solidFill>
-              </a:rPr>
-              <a:t>ecision</a:t>
-            </a:r>
-            <a:endParaRPr lang="es-ES" sz="8800" b="1" dirty="0">
+              <a:t>optimum</a:t>
+            </a:r>
+            <a:endParaRPr lang="es-ES" sz="23900" b="1" dirty="0">
               <a:ln w="28575">
                 <a:solidFill>
                   <a:schemeClr val="bg1"/>
@@ -6446,78 +6636,10 @@
           </a:prstGeom>
         </p:spPr>
       </p:pic>
-      <p:sp>
-        <p:nvSpPr>
-          <p:cNvPr id="2" name="Rectangle 1">
-            <a:extLst>
-              <a:ext uri="{FF2B5EF4-FFF2-40B4-BE49-F238E27FC236}">
-                <a16:creationId xmlns:a16="http://schemas.microsoft.com/office/drawing/2014/main" id="{EB9FAF3B-04EF-49E6-9961-27EE5FB921D4}"/>
-              </a:ext>
-            </a:extLst>
-          </p:cNvPr>
-          <p:cNvSpPr/>
-          <p:nvPr/>
-        </p:nvSpPr>
-        <p:spPr>
-          <a:xfrm rot="19800000">
-            <a:off x="1902178" y="2624667"/>
-            <a:ext cx="3691466" cy="2026355"/>
-          </a:xfrm>
-          <a:prstGeom prst="rect">
-            <a:avLst/>
-          </a:prstGeom>
-        </p:spPr>
-        <p:style>
-          <a:lnRef idx="2">
-            <a:schemeClr val="accent2">
-              <a:shade val="50000"/>
-            </a:schemeClr>
-          </a:lnRef>
-          <a:fillRef idx="1">
-            <a:schemeClr val="accent2"/>
-          </a:fillRef>
-          <a:effectRef idx="0">
-            <a:schemeClr val="accent2"/>
-          </a:effectRef>
-          <a:fontRef idx="minor">
-            <a:schemeClr val="lt1"/>
-          </a:fontRef>
-        </p:style>
-        <p:txBody>
-          <a:bodyPr rtlCol="0" anchor="ctr"/>
-          <a:lstStyle/>
-          <a:p>
-            <a:pPr algn="ctr"/>
-            <a:r>
-              <a:rPr lang="es-ES" dirty="0"/>
-              <a:t>Guardar idea: </a:t>
-            </a:r>
-          </a:p>
-          <a:p>
-            <a:pPr algn="ctr"/>
-            <a:endParaRPr lang="es-ES" dirty="0"/>
-          </a:p>
-          <a:p>
-            <a:pPr algn="ctr"/>
-            <a:r>
-              <a:rPr lang="es-ES" dirty="0"/>
-              <a:t>Crear bucle de formación de palabras como en A++ = </a:t>
-            </a:r>
-            <a:r>
-              <a:rPr lang="es-ES" dirty="0" err="1"/>
-              <a:t>maxmaxdata</a:t>
-            </a:r>
-            <a:r>
-              <a:rPr lang="es-ES" dirty="0"/>
-              <a:t> = mmd</a:t>
-            </a:r>
-          </a:p>
-        </p:txBody>
-      </p:sp>
     </p:spTree>
     <p:extLst>
       <p:ext uri="{BB962C8B-B14F-4D97-AF65-F5344CB8AC3E}">
-        <p14:creationId xmlns:p14="http://schemas.microsoft.com/office/powerpoint/2010/main" val="3156351492"/>
+        <p14:creationId xmlns:p14="http://schemas.microsoft.com/office/powerpoint/2010/main" val="1193875847"/>
       </p:ext>
     </p:extLst>
   </p:cSld>

</xml_diff>